<commit_message>
Added Sprint 1 sample code
</commit_message>
<xml_diff>
--- a/Training Materials/Week 2/Day 3/2. Persisting Objects with Serialization/Slides/persisting-objects-with-serialization-slides.pptx
+++ b/Training Materials/Week 2/Day 3/2. Persisting Objects with Serialization/Slides/persisting-objects-with-serialization-slides.pptx
@@ -7059,6 +7059,16 @@
                         <a:t> </a:t>
                       </a:r>
                       <a:r>
+                        <a:rPr lang="en-US" sz="1800" spc="-10" dirty="0">
+                          <a:solidFill>
+                            <a:srgbClr val="404040"/>
+                          </a:solidFill>
+                          <a:latin typeface="Courier New" panose="02070309020205020404"/>
+                          <a:cs typeface="Courier New" panose="02070309020205020404"/>
+                        </a:rPr>
+                        <a:t>loadGroup</a:t>
+                      </a:r>
+                      <a:r>
                         <a:rPr sz="1800" spc="-10" dirty="0">
                           <a:solidFill>
                             <a:srgbClr val="404040"/>
@@ -7066,7 +7076,7 @@
                           <a:latin typeface="Courier New" panose="02070309020205020404"/>
                           <a:cs typeface="Courier New" panose="02070309020205020404"/>
                         </a:rPr>
-                        <a:t>loadAccount(“group.dat”);</a:t>
+                        <a:t>(“group.dat”);</a:t>
                       </a:r>
                       <a:endParaRPr sz="1800">
                         <a:latin typeface="Courier New" panose="02070309020205020404"/>

</xml_diff>